<commit_message>
update presentation with tables description
</commit_message>
<xml_diff>
--- a/Oscar Winners.pptx
+++ b/Oscar Winners.pptx
@@ -113,7 +113,18 @@
   </p:defaultTextStyle>
   <p:extLst>
     <p:ext uri="{EFAFB233-063F-42B5-8137-9DF3F51BA10A}">
-      <p15:sldGuideLst xmlns="" xmlns:p15="http://schemas.microsoft.com/office/powerpoint/2012/main"/>
+      <p15:sldGuideLst xmlns:p15="http://schemas.microsoft.com/office/powerpoint/2012/main">
+        <p15:guide id="1" orient="horz" pos="2160">
+          <p15:clr>
+            <a:srgbClr val="A4A3A4"/>
+          </p15:clr>
+        </p15:guide>
+        <p15:guide id="2" pos="3840">
+          <p15:clr>
+            <a:srgbClr val="A4A3A4"/>
+          </p15:clr>
+        </p15:guide>
+      </p15:sldGuideLst>
     </p:ext>
   </p:extLst>
 </p:presentation>
@@ -6065,7 +6076,7 @@
           <p:cNvPr id="2" name="Title 1">
             <a:extLst>
               <a:ext uri="{FF2B5EF4-FFF2-40B4-BE49-F238E27FC236}">
-                <a16:creationId xmlns="" xmlns:a16="http://schemas.microsoft.com/office/drawing/2014/main" id="{690A9E44-E3DA-4D47-AD0C-6251DC1E144A}"/>
+                <a16:creationId xmlns:a16="http://schemas.microsoft.com/office/drawing/2014/main" id="{690A9E44-E3DA-4D47-AD0C-6251DC1E144A}"/>
               </a:ext>
             </a:extLst>
           </p:cNvPr>
@@ -6107,7 +6118,7 @@
           <p:cNvPr id="3" name="Subtitle 2">
             <a:extLst>
               <a:ext uri="{FF2B5EF4-FFF2-40B4-BE49-F238E27FC236}">
-                <a16:creationId xmlns="" xmlns:a16="http://schemas.microsoft.com/office/drawing/2014/main" id="{C54761D0-B909-428C-A573-757882D3D17A}"/>
+                <a16:creationId xmlns:a16="http://schemas.microsoft.com/office/drawing/2014/main" id="{C54761D0-B909-428C-A573-757882D3D17A}"/>
               </a:ext>
             </a:extLst>
           </p:cNvPr>
@@ -6148,13 +6159,6 @@
   <p:clrMapOvr>
     <a:masterClrMapping/>
   </p:clrMapOvr>
-  <p:timing>
-    <p:tnLst>
-      <p:par>
-        <p:cTn xmlns:p14="http://schemas.microsoft.com/office/powerpoint/2010/main" id="1" dur="indefinite" restart="never" nodeType="tmRoot"/>
-      </p:par>
-    </p:tnLst>
-  </p:timing>
 </p:sld>
 </file>
 
@@ -6192,7 +6196,7 @@
           <p:cNvPr id="2" name="Title 1">
             <a:extLst>
               <a:ext uri="{FF2B5EF4-FFF2-40B4-BE49-F238E27FC236}">
-                <a16:creationId xmlns="" xmlns:a16="http://schemas.microsoft.com/office/drawing/2014/main" id="{D707BC6F-8FD1-4ECA-882C-BA433F21420A}"/>
+                <a16:creationId xmlns:a16="http://schemas.microsoft.com/office/drawing/2014/main" id="{D707BC6F-8FD1-4ECA-882C-BA433F21420A}"/>
               </a:ext>
             </a:extLst>
           </p:cNvPr>
@@ -6228,7 +6232,7 @@
           <p:cNvPr id="3" name="Content Placeholder 2">
             <a:extLst>
               <a:ext uri="{FF2B5EF4-FFF2-40B4-BE49-F238E27FC236}">
-                <a16:creationId xmlns="" xmlns:a16="http://schemas.microsoft.com/office/drawing/2014/main" id="{A1F7A227-3574-40A7-9AAC-78EF0A92E69C}"/>
+                <a16:creationId xmlns:a16="http://schemas.microsoft.com/office/drawing/2014/main" id="{A1F7A227-3574-40A7-9AAC-78EF0A92E69C}"/>
               </a:ext>
             </a:extLst>
           </p:cNvPr>
@@ -6269,15 +6273,7 @@
             </a:pPr>
             <a:r>
               <a:rPr lang="en-US" dirty="0"/>
-              <a:t>Our Goal was to Create an interactive </a:t>
-            </a:r>
-            <a:r>
-              <a:rPr lang="en-US" dirty="0" smtClean="0"/>
-              <a:t>Dashboard, map, and table  </a:t>
-            </a:r>
-            <a:r>
-              <a:rPr lang="en-US" dirty="0"/>
-              <a:t>to display recent and historical Academy Award Winners.  The User would be able to select Winners and details for the following categories:</a:t>
+              <a:t>Our Goal was to Create an interactive Dashboard, map, and table  to display recent and historical Academy Award Winners.  The User would be able to select Winners and details for the following categories:</a:t>
             </a:r>
           </a:p>
           <a:p>
@@ -6322,13 +6318,6 @@
   <p:clrMapOvr>
     <a:masterClrMapping/>
   </p:clrMapOvr>
-  <p:timing>
-    <p:tnLst>
-      <p:par>
-        <p:cTn xmlns:p14="http://schemas.microsoft.com/office/powerpoint/2010/main" id="1" dur="indefinite" restart="never" nodeType="tmRoot"/>
-      </p:par>
-    </p:tnLst>
-  </p:timing>
 </p:sld>
 </file>
 
@@ -6354,7 +6343,7 @@
           <p:cNvPr id="2" name="Title 1">
             <a:extLst>
               <a:ext uri="{FF2B5EF4-FFF2-40B4-BE49-F238E27FC236}">
-                <a16:creationId xmlns="" xmlns:a16="http://schemas.microsoft.com/office/drawing/2014/main" id="{F7EDED88-ED5C-4323-8722-EDA35DA93FCB}"/>
+                <a16:creationId xmlns:a16="http://schemas.microsoft.com/office/drawing/2014/main" id="{F7EDED88-ED5C-4323-8722-EDA35DA93FCB}"/>
               </a:ext>
             </a:extLst>
           </p:cNvPr>
@@ -6390,7 +6379,7 @@
           <p:cNvPr id="3" name="Content Placeholder 2">
             <a:extLst>
               <a:ext uri="{FF2B5EF4-FFF2-40B4-BE49-F238E27FC236}">
-                <a16:creationId xmlns="" xmlns:a16="http://schemas.microsoft.com/office/drawing/2014/main" id="{494B7B6F-1A92-42D9-8A02-EDBDA763A509}"/>
+                <a16:creationId xmlns:a16="http://schemas.microsoft.com/office/drawing/2014/main" id="{494B7B6F-1A92-42D9-8A02-EDBDA763A509}"/>
               </a:ext>
             </a:extLst>
           </p:cNvPr>
@@ -6460,18 +6449,9 @@
               <a:buNone/>
             </a:pPr>
             <a:r>
-              <a:rPr lang="en-US" dirty="0" smtClean="0"/>
-              <a:t>Once the date was collected, a </a:t>
-            </a:r>
-            <a:r>
-              <a:rPr lang="en-US" dirty="0" smtClean="0"/>
-              <a:t>SQLite </a:t>
-            </a:r>
-            <a:r>
-              <a:rPr lang="en-US" dirty="0" smtClean="0"/>
-              <a:t>table was created to simplify querying the results</a:t>
-            </a:r>
-            <a:endParaRPr lang="en-US" dirty="0"/>
+              <a:rPr lang="en-US" dirty="0"/>
+              <a:t>Once the date was collected, a SQLite table was created to simplify querying the results</a:t>
+            </a:r>
           </a:p>
         </p:txBody>
       </p:sp>
@@ -6485,13 +6465,6 @@
   <p:clrMapOvr>
     <a:masterClrMapping/>
   </p:clrMapOvr>
-  <p:timing>
-    <p:tnLst>
-      <p:par>
-        <p:cTn xmlns:p14="http://schemas.microsoft.com/office/powerpoint/2010/main" id="1" dur="indefinite" restart="never" nodeType="tmRoot"/>
-      </p:par>
-    </p:tnLst>
-  </p:timing>
 </p:sld>
 </file>
 
@@ -6517,7 +6490,7 @@
           <p:cNvPr id="2" name="Title 1">
             <a:extLst>
               <a:ext uri="{FF2B5EF4-FFF2-40B4-BE49-F238E27FC236}">
-                <a16:creationId xmlns="" xmlns:a16="http://schemas.microsoft.com/office/drawing/2014/main" id="{18E22418-88B0-481D-A539-2F0F94E6B3FF}"/>
+                <a16:creationId xmlns:a16="http://schemas.microsoft.com/office/drawing/2014/main" id="{18E22418-88B0-481D-A539-2F0F94E6B3FF}"/>
               </a:ext>
             </a:extLst>
           </p:cNvPr>
@@ -6540,18 +6513,13 @@
           <a:lstStyle/>
           <a:p>
             <a:r>
-              <a:rPr lang="en-US" dirty="0" smtClean="0">
+              <a:rPr lang="en-US" dirty="0">
                 <a:solidFill>
                   <a:schemeClr val="bg1"/>
                 </a:solidFill>
               </a:rPr>
               <a:t>Oscar winner Dashboard Elements</a:t>
             </a:r>
-            <a:endParaRPr lang="en-US" dirty="0">
-              <a:solidFill>
-                <a:schemeClr val="bg1"/>
-              </a:solidFill>
-            </a:endParaRPr>
           </a:p>
         </p:txBody>
       </p:sp>
@@ -6560,7 +6528,7 @@
           <p:cNvPr id="3" name="Text Placeholder 2">
             <a:extLst>
               <a:ext uri="{FF2B5EF4-FFF2-40B4-BE49-F238E27FC236}">
-                <a16:creationId xmlns="" xmlns:a16="http://schemas.microsoft.com/office/drawing/2014/main" id="{E5EF7321-1A0E-48CD-A456-726BA04019F5}"/>
+                <a16:creationId xmlns:a16="http://schemas.microsoft.com/office/drawing/2014/main" id="{E5EF7321-1A0E-48CD-A456-726BA04019F5}"/>
               </a:ext>
             </a:extLst>
           </p:cNvPr>
@@ -6592,7 +6560,7 @@
           <p:cNvPr id="4" name="Text Placeholder 3">
             <a:extLst>
               <a:ext uri="{FF2B5EF4-FFF2-40B4-BE49-F238E27FC236}">
-                <a16:creationId xmlns="" xmlns:a16="http://schemas.microsoft.com/office/drawing/2014/main" id="{7124BDF4-6FD5-45D0-99C3-4F3865894D34}"/>
+                <a16:creationId xmlns:a16="http://schemas.microsoft.com/office/drawing/2014/main" id="{7124BDF4-6FD5-45D0-99C3-4F3865894D34}"/>
               </a:ext>
             </a:extLst>
           </p:cNvPr>
@@ -6619,10 +6587,9 @@
               <a:buChar char="•"/>
             </a:pPr>
             <a:r>
-              <a:rPr lang="en-US" dirty="0" smtClean="0"/>
+              <a:rPr lang="en-US" dirty="0"/>
               <a:t>The pie Chart was developed with a combination of python, route creation in flask and plotly js</a:t>
             </a:r>
-            <a:endParaRPr lang="en-US" dirty="0"/>
           </a:p>
           <a:p>
             <a:pPr marL="285750" indent="-285750" algn="l">
@@ -6630,7 +6597,7 @@
               <a:buChar char="•"/>
             </a:pPr>
             <a:r>
-              <a:rPr lang="en-US" dirty="0" smtClean="0"/>
+              <a:rPr lang="en-US" dirty="0"/>
               <a:t>The pie chart demonstrates which genres have been most successful in winning best actor, actress, director, and best picture</a:t>
             </a:r>
           </a:p>
@@ -6641,7 +6608,7 @@
           <p:cNvPr id="5" name="Text Placeholder 4">
             <a:extLst>
               <a:ext uri="{FF2B5EF4-FFF2-40B4-BE49-F238E27FC236}">
-                <a16:creationId xmlns="" xmlns:a16="http://schemas.microsoft.com/office/drawing/2014/main" id="{D62DF0B0-BAB8-459A-A3C2-8989A00B4D03}"/>
+                <a16:creationId xmlns:a16="http://schemas.microsoft.com/office/drawing/2014/main" id="{D62DF0B0-BAB8-459A-A3C2-8989A00B4D03}"/>
               </a:ext>
             </a:extLst>
           </p:cNvPr>
@@ -6673,7 +6640,7 @@
           <p:cNvPr id="6" name="Text Placeholder 5">
             <a:extLst>
               <a:ext uri="{FF2B5EF4-FFF2-40B4-BE49-F238E27FC236}">
-                <a16:creationId xmlns="" xmlns:a16="http://schemas.microsoft.com/office/drawing/2014/main" id="{BE40EBA6-FD5E-481B-BD86-6874831B4998}"/>
+                <a16:creationId xmlns:a16="http://schemas.microsoft.com/office/drawing/2014/main" id="{BE40EBA6-FD5E-481B-BD86-6874831B4998}"/>
               </a:ext>
             </a:extLst>
           </p:cNvPr>
@@ -6700,7 +6667,7 @@
               <a:buChar char="•"/>
             </a:pPr>
             <a:r>
-              <a:rPr lang="en-US" dirty="0" smtClean="0"/>
+              <a:rPr lang="en-US" dirty="0"/>
               <a:t>The bar chart was created with sql queries to our SQLite data table, routes created in flask, and plotly js</a:t>
             </a:r>
           </a:p>
@@ -6710,10 +6677,9 @@
               <a:buChar char="•"/>
             </a:pPr>
             <a:r>
-              <a:rPr lang="en-US" dirty="0" smtClean="0"/>
+              <a:rPr lang="en-US" dirty="0"/>
               <a:t>The Bar chart compares the rotten tomatoes, imdb, and metacritic scores across winning categories</a:t>
             </a:r>
-            <a:endParaRPr lang="en-US" dirty="0"/>
           </a:p>
         </p:txBody>
       </p:sp>
@@ -6722,7 +6688,7 @@
           <p:cNvPr id="7" name="Text Placeholder 6">
             <a:extLst>
               <a:ext uri="{FF2B5EF4-FFF2-40B4-BE49-F238E27FC236}">
-                <a16:creationId xmlns="" xmlns:a16="http://schemas.microsoft.com/office/drawing/2014/main" id="{AAFBAB8B-0FF7-485F-8112-646466C3D784}"/>
+                <a16:creationId xmlns:a16="http://schemas.microsoft.com/office/drawing/2014/main" id="{AAFBAB8B-0FF7-485F-8112-646466C3D784}"/>
               </a:ext>
             </a:extLst>
           </p:cNvPr>
@@ -6739,18 +6705,13 @@
           <a:lstStyle/>
           <a:p>
             <a:r>
-              <a:rPr lang="en-US" dirty="0" smtClean="0">
+              <a:rPr lang="en-US" dirty="0">
                 <a:solidFill>
                   <a:schemeClr val="bg1"/>
                 </a:solidFill>
               </a:rPr>
               <a:t>Scatter</a:t>
             </a:r>
-            <a:endParaRPr lang="en-US" dirty="0">
-              <a:solidFill>
-                <a:schemeClr val="bg1"/>
-              </a:solidFill>
-            </a:endParaRPr>
           </a:p>
         </p:txBody>
       </p:sp>
@@ -6759,7 +6720,7 @@
           <p:cNvPr id="8" name="Text Placeholder 7">
             <a:extLst>
               <a:ext uri="{FF2B5EF4-FFF2-40B4-BE49-F238E27FC236}">
-                <a16:creationId xmlns="" xmlns:a16="http://schemas.microsoft.com/office/drawing/2014/main" id="{A44334AE-F2DE-4533-88FC-7209655B744C}"/>
+                <a16:creationId xmlns:a16="http://schemas.microsoft.com/office/drawing/2014/main" id="{A44334AE-F2DE-4533-88FC-7209655B744C}"/>
               </a:ext>
             </a:extLst>
           </p:cNvPr>
@@ -6786,24 +6747,8 @@
               <a:buChar char="•"/>
             </a:pPr>
             <a:r>
-              <a:rPr lang="en-US" dirty="0" smtClean="0"/>
-              <a:t>The scatter plot </a:t>
-            </a:r>
-            <a:r>
               <a:rPr lang="en-US" dirty="0"/>
-              <a:t>was created with sql queries to our </a:t>
-            </a:r>
-            <a:r>
-              <a:rPr lang="en-US" dirty="0" smtClean="0"/>
-              <a:t>SQLite </a:t>
-            </a:r>
-            <a:r>
-              <a:rPr lang="en-US" dirty="0"/>
-              <a:t>data table, routes created in flask, and plotly </a:t>
-            </a:r>
-            <a:r>
-              <a:rPr lang="en-US" dirty="0" smtClean="0"/>
-              <a:t>js</a:t>
+              <a:t>The scatter plot was created with sql queries to our SQLite data table, routes created in flask, and plotly js</a:t>
             </a:r>
           </a:p>
           <a:p>
@@ -6812,18 +6757,17 @@
               <a:buChar char="•"/>
             </a:pPr>
             <a:r>
-              <a:rPr lang="en-US" dirty="0" smtClean="0"/>
+              <a:rPr lang="en-US" dirty="0"/>
               <a:t>The scatter plot compares the budget </a:t>
             </a:r>
             <a:r>
-              <a:rPr lang="en-US" dirty="0" err="1" smtClean="0"/>
+              <a:rPr lang="en-US" dirty="0" err="1"/>
               <a:t>vs</a:t>
             </a:r>
             <a:r>
-              <a:rPr lang="en-US" dirty="0" smtClean="0"/>
+              <a:rPr lang="en-US" dirty="0"/>
               <a:t> revenue of all films in winning categories</a:t>
             </a:r>
-            <a:endParaRPr lang="en-US" dirty="0"/>
           </a:p>
           <a:p>
             <a:endParaRPr lang="en-US" dirty="0"/>
@@ -6840,13 +6784,6 @@
   <p:clrMapOvr>
     <a:masterClrMapping/>
   </p:clrMapOvr>
-  <p:timing>
-    <p:tnLst>
-      <p:par>
-        <p:cTn xmlns:p14="http://schemas.microsoft.com/office/powerpoint/2010/main" id="1" dur="indefinite" restart="never" nodeType="tmRoot"/>
-      </p:par>
-    </p:tnLst>
-  </p:timing>
 </p:sld>
 </file>
 
@@ -6872,7 +6809,7 @@
           <p:cNvPr id="2" name="Title 1">
             <a:extLst>
               <a:ext uri="{FF2B5EF4-FFF2-40B4-BE49-F238E27FC236}">
-                <a16:creationId xmlns="" xmlns:a16="http://schemas.microsoft.com/office/drawing/2014/main" id="{BB289A1F-AF6D-42EA-AB96-B0BE35C2C697}"/>
+                <a16:creationId xmlns:a16="http://schemas.microsoft.com/office/drawing/2014/main" id="{BB289A1F-AF6D-42EA-AB96-B0BE35C2C697}"/>
               </a:ext>
             </a:extLst>
           </p:cNvPr>
@@ -6897,18 +6834,13 @@
           <a:lstStyle/>
           <a:p>
             <a:r>
-              <a:rPr lang="en-US" dirty="0" smtClean="0">
+              <a:rPr lang="en-US" dirty="0">
                 <a:solidFill>
                   <a:schemeClr val="bg1"/>
                 </a:solidFill>
               </a:rPr>
               <a:t>Oscar Winner Map</a:t>
             </a:r>
-            <a:endParaRPr lang="en-US" dirty="0">
-              <a:solidFill>
-                <a:schemeClr val="bg1"/>
-              </a:solidFill>
-            </a:endParaRPr>
           </a:p>
         </p:txBody>
       </p:sp>
@@ -6917,7 +6849,7 @@
           <p:cNvPr id="3" name="Content Placeholder 2">
             <a:extLst>
               <a:ext uri="{FF2B5EF4-FFF2-40B4-BE49-F238E27FC236}">
-                <a16:creationId xmlns="" xmlns:a16="http://schemas.microsoft.com/office/drawing/2014/main" id="{7452526F-2E52-4D35-AF4A-25EA2F1D0A2D}"/>
+                <a16:creationId xmlns:a16="http://schemas.microsoft.com/office/drawing/2014/main" id="{7452526F-2E52-4D35-AF4A-25EA2F1D0A2D}"/>
               </a:ext>
             </a:extLst>
           </p:cNvPr>
@@ -6945,7 +6877,7 @@
               </a:lnSpc>
             </a:pPr>
             <a:r>
-              <a:rPr lang="en-US" dirty="0" smtClean="0"/>
+              <a:rPr lang="en-US" dirty="0"/>
               <a:t>The Oscar winner map has the functionality to filter out the places of origin of Best Director, Actor, and Actresses</a:t>
             </a:r>
           </a:p>
@@ -6956,7 +6888,7 @@
               </a:lnSpc>
             </a:pPr>
             <a:r>
-              <a:rPr lang="en-US" dirty="0" smtClean="0"/>
+              <a:rPr lang="en-US" dirty="0"/>
               <a:t>This was developed using leaflet for JavaScript</a:t>
             </a:r>
           </a:p>
@@ -6967,7 +6899,7 @@
               </a:lnSpc>
             </a:pPr>
             <a:r>
-              <a:rPr lang="en-US" dirty="0" smtClean="0"/>
+              <a:rPr lang="en-US" dirty="0"/>
               <a:t>The majority of Oscar winners are from the united states and Europe</a:t>
             </a:r>
           </a:p>
@@ -6983,13 +6915,6 @@
   <p:clrMapOvr>
     <a:masterClrMapping/>
   </p:clrMapOvr>
-  <p:timing>
-    <p:tnLst>
-      <p:par>
-        <p:cTn xmlns:p14="http://schemas.microsoft.com/office/powerpoint/2010/main" id="1" dur="indefinite" restart="never" nodeType="tmRoot"/>
-      </p:par>
-    </p:tnLst>
-  </p:timing>
 </p:sld>
 </file>
 
@@ -7015,7 +6940,7 @@
           <p:cNvPr id="2" name="Title 1">
             <a:extLst>
               <a:ext uri="{FF2B5EF4-FFF2-40B4-BE49-F238E27FC236}">
-                <a16:creationId xmlns="" xmlns:a16="http://schemas.microsoft.com/office/drawing/2014/main" id="{235EB4AD-679C-459B-9588-A74E22BF2254}"/>
+                <a16:creationId xmlns:a16="http://schemas.microsoft.com/office/drawing/2014/main" id="{235EB4AD-679C-459B-9588-A74E22BF2254}"/>
               </a:ext>
             </a:extLst>
           </p:cNvPr>
@@ -7051,7 +6976,7 @@
           <p:cNvPr id="3" name="Content Placeholder 2">
             <a:extLst>
               <a:ext uri="{FF2B5EF4-FFF2-40B4-BE49-F238E27FC236}">
-                <a16:creationId xmlns="" xmlns:a16="http://schemas.microsoft.com/office/drawing/2014/main" id="{615B8DD0-19EC-4685-81CD-270A6D4C3259}"/>
+                <a16:creationId xmlns:a16="http://schemas.microsoft.com/office/drawing/2014/main" id="{615B8DD0-19EC-4685-81CD-270A6D4C3259}"/>
               </a:ext>
             </a:extLst>
           </p:cNvPr>
@@ -7072,6 +6997,29 @@
         <p:txBody>
           <a:bodyPr/>
           <a:lstStyle/>
+          <a:p>
+            <a:r>
+              <a:rPr lang="en-US" dirty="0"/>
+              <a:t>Oscar table allows for filtering of: Ceremony, Year of ceremony, award, and movie genre</a:t>
+            </a:r>
+          </a:p>
+          <a:p>
+            <a:r>
+              <a:rPr lang="en-US" dirty="0"/>
+              <a:t>Awards featured are best picture, actor in a leading role, actress in a leading role, best director</a:t>
+            </a:r>
+          </a:p>
+          <a:p>
+            <a:r>
+              <a:rPr lang="en-US" dirty="0"/>
+              <a:t>Table adapted to work for </a:t>
+            </a:r>
+            <a:r>
+              <a:rPr lang="en-US"/>
+              <a:t>smaller screens</a:t>
+            </a:r>
+            <a:endParaRPr lang="en-US" dirty="0"/>
+          </a:p>
           <a:p>
             <a:endParaRPr lang="en-US" dirty="0"/>
           </a:p>
@@ -7087,13 +7035,6 @@
   <p:clrMapOvr>
     <a:masterClrMapping/>
   </p:clrMapOvr>
-  <p:timing>
-    <p:tnLst>
-      <p:par>
-        <p:cTn xmlns:p14="http://schemas.microsoft.com/office/powerpoint/2010/main" id="1" dur="indefinite" restart="never" nodeType="tmRoot"/>
-      </p:par>
-    </p:tnLst>
-  </p:timing>
 </p:sld>
 </file>
 
@@ -7119,7 +7060,7 @@
           <p:cNvPr id="2" name="Title 1">
             <a:extLst>
               <a:ext uri="{FF2B5EF4-FFF2-40B4-BE49-F238E27FC236}">
-                <a16:creationId xmlns="" xmlns:a16="http://schemas.microsoft.com/office/drawing/2014/main" id="{ED6251CE-F8B2-42E5-B1EF-15481B1C2D6D}"/>
+                <a16:creationId xmlns:a16="http://schemas.microsoft.com/office/drawing/2014/main" id="{ED6251CE-F8B2-42E5-B1EF-15481B1C2D6D}"/>
               </a:ext>
             </a:extLst>
           </p:cNvPr>
@@ -7144,18 +7085,13 @@
           <a:lstStyle/>
           <a:p>
             <a:r>
-              <a:rPr lang="en-US" dirty="0" smtClean="0">
+              <a:rPr lang="en-US" dirty="0">
                 <a:solidFill>
                   <a:schemeClr val="bg1"/>
                 </a:solidFill>
               </a:rPr>
               <a:t>Data insights</a:t>
             </a:r>
-            <a:endParaRPr lang="en-US" dirty="0">
-              <a:solidFill>
-                <a:schemeClr val="bg1"/>
-              </a:solidFill>
-            </a:endParaRPr>
           </a:p>
         </p:txBody>
       </p:sp>
@@ -7164,7 +7100,7 @@
           <p:cNvPr id="8" name="Content Placeholder 7">
             <a:extLst>
               <a:ext uri="{FF2B5EF4-FFF2-40B4-BE49-F238E27FC236}">
-                <a16:creationId xmlns="" xmlns:a16="http://schemas.microsoft.com/office/drawing/2014/main" id="{6B8EF9CC-1E5E-414B-A279-1D78A22C9A51}"/>
+                <a16:creationId xmlns:a16="http://schemas.microsoft.com/office/drawing/2014/main" id="{6B8EF9CC-1E5E-414B-A279-1D78A22C9A51}"/>
               </a:ext>
             </a:extLst>
           </p:cNvPr>
@@ -7199,7 +7135,7 @@
           <p:cNvPr id="4" name="Text Placeholder 3">
             <a:extLst>
               <a:ext uri="{FF2B5EF4-FFF2-40B4-BE49-F238E27FC236}">
-                <a16:creationId xmlns="" xmlns:a16="http://schemas.microsoft.com/office/drawing/2014/main" id="{A7515BFD-A006-4030-8A26-48A288161ABB}"/>
+                <a16:creationId xmlns:a16="http://schemas.microsoft.com/office/drawing/2014/main" id="{A7515BFD-A006-4030-8A26-48A288161ABB}"/>
               </a:ext>
             </a:extLst>
           </p:cNvPr>
@@ -7233,61 +7169,24 @@
                   <a:schemeClr val="bg1"/>
                 </a:solidFill>
               </a:rPr>
-              <a:t>To increase your chances of </a:t>
-            </a:r>
-            <a:r>
-              <a:rPr lang="en-US" dirty="0" smtClean="0">
-                <a:solidFill>
-                  <a:schemeClr val="bg1"/>
-                </a:solidFill>
-              </a:rPr>
-              <a:t>winning an Oscar, </a:t>
-            </a:r>
+              <a:t>To increase your chances of winning an Oscar, pick a Drama or Biography and Be Born  in United states </a:t>
+            </a:r>
+          </a:p>
+          <a:p>
+            <a:pPr marL="285750" indent="-285750" algn="l">
+              <a:buFont typeface="Arial"/>
+              <a:buChar char="•"/>
+            </a:pPr>
             <a:r>
               <a:rPr lang="en-US" dirty="0">
                 <a:solidFill>
                   <a:schemeClr val="bg1"/>
                 </a:solidFill>
               </a:rPr>
-              <a:t>pick a Drama or Biography and Be Born  in United states </a:t>
-            </a:r>
-            <a:endParaRPr lang="en-US" dirty="0" smtClean="0">
-              <a:solidFill>
-                <a:schemeClr val="bg1"/>
-              </a:solidFill>
-            </a:endParaRPr>
-          </a:p>
-          <a:p>
-            <a:pPr marL="285750" indent="-285750" algn="l">
-              <a:buFont typeface="Arial"/>
-              <a:buChar char="•"/>
-            </a:pPr>
-            <a:r>
-              <a:rPr lang="en-US" dirty="0" smtClean="0">
-                <a:solidFill>
-                  <a:schemeClr val="bg1"/>
-                </a:solidFill>
-              </a:rPr>
-              <a:t>Titanic is </a:t>
-            </a:r>
-            <a:r>
-              <a:rPr lang="en-US" dirty="0" smtClean="0">
-                <a:solidFill>
-                  <a:schemeClr val="bg1"/>
-                </a:solidFill>
-              </a:rPr>
-              <a:t>the Most </a:t>
-            </a:r>
-            <a:r>
-              <a:rPr lang="en-US" dirty="0" smtClean="0">
-                <a:solidFill>
-                  <a:schemeClr val="bg1"/>
-                </a:solidFill>
-              </a:rPr>
-              <a:t>profitable </a:t>
-            </a:r>
-            <a:r>
-              <a:rPr lang="en-US" dirty="0" err="1" smtClean="0">
+              <a:t>Titanic is the Most profitable </a:t>
+            </a:r>
+            <a:r>
+              <a:rPr lang="en-US" dirty="0" err="1">
                 <a:solidFill>
                   <a:schemeClr val="bg1"/>
                 </a:solidFill>
@@ -7295,7 +7194,7 @@
               <a:t>oscar</a:t>
             </a:r>
             <a:r>
-              <a:rPr lang="en-US" dirty="0" smtClean="0">
+              <a:rPr lang="en-US" dirty="0">
                 <a:solidFill>
                   <a:schemeClr val="bg1"/>
                 </a:solidFill>
@@ -7309,7 +7208,7 @@
               <a:buChar char="•"/>
             </a:pPr>
             <a:r>
-              <a:rPr lang="en-US" dirty="0" smtClean="0">
+              <a:rPr lang="en-US" dirty="0">
                 <a:solidFill>
                   <a:schemeClr val="bg1"/>
                 </a:solidFill>
@@ -7323,7 +7222,7 @@
               <a:buChar char="•"/>
             </a:pPr>
             <a:r>
-              <a:rPr lang="en-US" dirty="0" smtClean="0">
+              <a:rPr lang="en-US" dirty="0">
                 <a:solidFill>
                   <a:schemeClr val="bg1"/>
                 </a:solidFill>
@@ -7354,13 +7253,6 @@
   <p:clrMapOvr>
     <a:masterClrMapping/>
   </p:clrMapOvr>
-  <p:timing>
-    <p:tnLst>
-      <p:par>
-        <p:cTn xmlns:p14="http://schemas.microsoft.com/office/powerpoint/2010/main" id="1" dur="indefinite" restart="never" nodeType="tmRoot"/>
-      </p:par>
-    </p:tnLst>
-  </p:timing>
 </p:sld>
 </file>
 
@@ -7398,7 +7290,7 @@
           <p:cNvPr id="2" name="Title 1">
             <a:extLst>
               <a:ext uri="{FF2B5EF4-FFF2-40B4-BE49-F238E27FC236}">
-                <a16:creationId xmlns="" xmlns:a16="http://schemas.microsoft.com/office/drawing/2014/main" id="{D707BC6F-8FD1-4ECA-882C-BA433F21420A}"/>
+                <a16:creationId xmlns:a16="http://schemas.microsoft.com/office/drawing/2014/main" id="{D707BC6F-8FD1-4ECA-882C-BA433F21420A}"/>
               </a:ext>
             </a:extLst>
           </p:cNvPr>
@@ -7434,7 +7326,7 @@
           <p:cNvPr id="3" name="Content Placeholder 2">
             <a:extLst>
               <a:ext uri="{FF2B5EF4-FFF2-40B4-BE49-F238E27FC236}">
-                <a16:creationId xmlns="" xmlns:a16="http://schemas.microsoft.com/office/drawing/2014/main" id="{A1F7A227-3574-40A7-9AAC-78EF0A92E69C}"/>
+                <a16:creationId xmlns:a16="http://schemas.microsoft.com/office/drawing/2014/main" id="{A1F7A227-3574-40A7-9AAC-78EF0A92E69C}"/>
               </a:ext>
             </a:extLst>
           </p:cNvPr>
@@ -7462,27 +7354,19 @@
           <a:lstStyle/>
           <a:p>
             <a:r>
-              <a:rPr lang="en-US" dirty="0" smtClean="0"/>
-              <a:t>Finding the data we needed required a combination of utilizing </a:t>
-            </a:r>
-            <a:r>
-              <a:rPr lang="en-US" dirty="0" smtClean="0"/>
-              <a:t>web scraped data </a:t>
-            </a:r>
-            <a:r>
-              <a:rPr lang="en-US" dirty="0" smtClean="0"/>
-              <a:t>sources and manually looking up individual data points, finding publicly available datasets would have increased the simplicity of the project</a:t>
-            </a:r>
-          </a:p>
-          <a:p>
-            <a:r>
-              <a:rPr lang="en-US" dirty="0" smtClean="0"/>
+              <a:rPr lang="en-US" dirty="0"/>
+              <a:t>Finding the data we needed required a combination of utilizing web scraped data sources and manually looking up individual data points, finding publicly available datasets would have increased the simplicity of the project</a:t>
+            </a:r>
+          </a:p>
+          <a:p>
+            <a:r>
+              <a:rPr lang="en-US" dirty="0"/>
               <a:t>Creating dropdown functionality in JavaScript was the most difficult aspect of the project</a:t>
             </a:r>
           </a:p>
           <a:p>
             <a:r>
-              <a:rPr lang="en-US" dirty="0" smtClean="0"/>
+              <a:rPr lang="en-US" dirty="0"/>
               <a:t>Future enhancement for this app would be including additional winning categories and finding other meaningful metrics to compare</a:t>
             </a:r>
           </a:p>
@@ -7490,13 +7374,13 @@
             <a:pPr marL="0" indent="0">
               <a:buNone/>
             </a:pPr>
-            <a:endParaRPr lang="en-US" dirty="0" smtClean="0"/>
-          </a:p>
-          <a:p>
-            <a:endParaRPr lang="en-US" dirty="0" smtClean="0"/>
-          </a:p>
-          <a:p>
-            <a:endParaRPr lang="en-US" dirty="0" smtClean="0"/>
+            <a:endParaRPr lang="en-US" dirty="0"/>
+          </a:p>
+          <a:p>
+            <a:endParaRPr lang="en-US" dirty="0"/>
+          </a:p>
+          <a:p>
+            <a:endParaRPr lang="en-US" dirty="0"/>
           </a:p>
           <a:p>
             <a:endParaRPr lang="en-US" dirty="0"/>
@@ -7513,13 +7397,6 @@
   <p:clrMapOvr>
     <a:masterClrMapping/>
   </p:clrMapOvr>
-  <p:timing>
-    <p:tnLst>
-      <p:par>
-        <p:cTn xmlns:p14="http://schemas.microsoft.com/office/powerpoint/2010/main" id="1" dur="indefinite" restart="never" nodeType="tmRoot"/>
-      </p:par>
-    </p:tnLst>
-  </p:timing>
 </p:sld>
 </file>
 
@@ -7744,7 +7621,7 @@
   <a:extraClrSchemeLst/>
   <a:extLst>
     <a:ext uri="{05A4C25C-085E-4340-85A3-A5531E510DB2}">
-      <thm15:themeFamily xmlns="" xmlns:thm15="http://schemas.microsoft.com/office/thememl/2012/main" name="Main Event" id="{AC372BB4-D83D-411E-B849-B641926BA760}" vid="{F1EFBDE3-1A95-4E3D-81AD-1F53D65BEA01}"/>
+      <thm15:themeFamily xmlns:thm15="http://schemas.microsoft.com/office/thememl/2012/main" name="Main Event" id="{AC372BB4-D83D-411E-B849-B641926BA760}" vid="{F1EFBDE3-1A95-4E3D-81AD-1F53D65BEA01}"/>
     </a:ext>
   </a:extLst>
 </a:theme>

</xml_diff>